<commit_message>
ggplot for slides for Session4
</commit_message>
<xml_diff>
--- a/Session4/MLW_KUHeS_RandStatistics_Session4.pptx
+++ b/Session4/MLW_KUHeS_RandStatistics_Session4.pptx
@@ -4807,12 +4807,34 @@
             </a:pPr>
             <a:r>
               <a:rPr>
+                <a:latin typeface="Courier"/>
+              </a:rPr>
+              <a:t>df1 </a:t>
+            </a:r>
+            <a:r>
+              <a:rPr>
+                <a:solidFill>
+                  <a:srgbClr val="4070A0"/>
+                </a:solidFill>
+                <a:latin typeface="Courier"/>
+              </a:rPr>
+              <a:t>%&gt;%</a:t>
+            </a:r>
+            <a:br/>
+            <a:r>
+              <a:rPr>
+                <a:latin typeface="Courier"/>
+              </a:rPr>
+              <a:t>  </a:t>
+            </a:r>
+            <a:r>
+              <a:rPr>
                 <a:solidFill>
                   <a:srgbClr val="06287E"/>
                 </a:solidFill>
                 <a:latin typeface="Courier"/>
               </a:rPr>
-              <a:t>par</a:t>
+              <a:t>ggplot</a:t>
             </a:r>
             <a:r>
               <a:rPr>
@@ -4827,7 +4849,77 @@
                 </a:solidFill>
                 <a:latin typeface="Courier"/>
               </a:rPr>
-              <a:t>cex.axis=</a:t>
+              <a:t>mapping=</a:t>
+            </a:r>
+            <a:r>
+              <a:rPr>
+                <a:solidFill>
+                  <a:srgbClr val="06287E"/>
+                </a:solidFill>
+                <a:latin typeface="Courier"/>
+              </a:rPr>
+              <a:t>aes</a:t>
+            </a:r>
+            <a:r>
+              <a:rPr>
+                <a:latin typeface="Courier"/>
+              </a:rPr>
+              <a:t>(</a:t>
+            </a:r>
+            <a:r>
+              <a:rPr>
+                <a:solidFill>
+                  <a:srgbClr val="7D9029"/>
+                </a:solidFill>
+                <a:latin typeface="Courier"/>
+              </a:rPr>
+              <a:t>x=</a:t>
+            </a:r>
+            <a:r>
+              <a:rPr>
+                <a:latin typeface="Courier"/>
+              </a:rPr>
+              <a:t>age)) </a:t>
+            </a:r>
+            <a:r>
+              <a:rPr>
+                <a:solidFill>
+                  <a:srgbClr val="4070A0"/>
+                </a:solidFill>
+                <a:latin typeface="Courier"/>
+              </a:rPr>
+              <a:t>+</a:t>
+            </a:r>
+            <a:br/>
+            <a:r>
+              <a:rPr>
+                <a:latin typeface="Courier"/>
+              </a:rPr>
+              <a:t>  </a:t>
+            </a:r>
+            <a:r>
+              <a:rPr>
+                <a:solidFill>
+                  <a:srgbClr val="06287E"/>
+                </a:solidFill>
+                <a:latin typeface="Courier"/>
+              </a:rPr>
+              <a:t>geom_histogram</a:t>
+            </a:r>
+            <a:r>
+              <a:rPr>
+                <a:latin typeface="Courier"/>
+              </a:rPr>
+              <a:t>(</a:t>
+            </a:r>
+            <a:r>
+              <a:rPr>
+                <a:solidFill>
+                  <a:srgbClr val="7D9029"/>
+                </a:solidFill>
+                <a:latin typeface="Courier"/>
+              </a:rPr>
+              <a:t>bins=</a:t>
             </a:r>
             <a:r>
               <a:rPr>
@@ -4836,7 +4928,7 @@
                 </a:solidFill>
                 <a:latin typeface="Courier"/>
               </a:rPr>
-              <a:t>2</a:t>
+              <a:t>20</a:t>
             </a:r>
             <a:r>
               <a:rPr>
@@ -4851,31 +4943,38 @@
                 </a:solidFill>
                 <a:latin typeface="Courier"/>
               </a:rPr>
-              <a:t>cex.lab=</a:t>
-            </a:r>
-            <a:r>
-              <a:rPr>
-                <a:solidFill>
-                  <a:srgbClr val="40A070"/>
-                </a:solidFill>
-                <a:latin typeface="Courier"/>
-              </a:rPr>
-              <a:t>2</a:t>
-            </a:r>
-            <a:r>
-              <a:rPr>
-                <a:latin typeface="Courier"/>
-              </a:rPr>
-              <a:t>,</a:t>
-            </a:r>
-            <a:r>
-              <a:rPr>
-                <a:solidFill>
-                  <a:srgbClr val="7D9029"/>
-                </a:solidFill>
-                <a:latin typeface="Courier"/>
-              </a:rPr>
-              <a:t>mfrow=</a:t>
+              <a:t>fill=</a:t>
+            </a:r>
+            <a:r>
+              <a:rPr>
+                <a:solidFill>
+                  <a:srgbClr val="4070A0"/>
+                </a:solidFill>
+                <a:latin typeface="Courier"/>
+              </a:rPr>
+              <a:t>"#ffa500"</a:t>
+            </a:r>
+            <a:r>
+              <a:rPr>
+                <a:latin typeface="Courier"/>
+              </a:rPr>
+              <a:t>) </a:t>
+            </a:r>
+            <a:r>
+              <a:rPr>
+                <a:solidFill>
+                  <a:srgbClr val="4070A0"/>
+                </a:solidFill>
+                <a:latin typeface="Courier"/>
+              </a:rPr>
+              <a:t>+</a:t>
+            </a:r>
+            <a:br/>
+            <a:r>
+              <a:rPr>
+                <a:latin typeface="Courier"/>
+              </a:rPr>
+              <a:t>  </a:t>
             </a:r>
             <a:r>
               <a:rPr>
@@ -4884,7 +4983,7 @@
                 </a:solidFill>
                 <a:latin typeface="Courier"/>
               </a:rPr>
-              <a:t>c</a:t>
+              <a:t>xlab</a:t>
             </a:r>
             <a:r>
               <a:rPr>
@@ -4895,183 +4994,17 @@
             <a:r>
               <a:rPr>
                 <a:solidFill>
-                  <a:srgbClr val="40A070"/>
-                </a:solidFill>
-                <a:latin typeface="Courier"/>
-              </a:rPr>
-              <a:t>1</a:t>
-            </a:r>
-            <a:r>
-              <a:rPr>
-                <a:latin typeface="Courier"/>
-              </a:rPr>
-              <a:t>,</a:t>
-            </a:r>
-            <a:r>
-              <a:rPr>
-                <a:solidFill>
-                  <a:srgbClr val="40A070"/>
-                </a:solidFill>
-                <a:latin typeface="Courier"/>
-              </a:rPr>
-              <a:t>1</a:t>
-            </a:r>
-            <a:r>
-              <a:rPr>
-                <a:latin typeface="Courier"/>
-              </a:rPr>
-              <a:t>))</a:t>
-            </a:r>
-            <a:br/>
-            <a:r>
-              <a:rPr>
-                <a:solidFill>
-                  <a:srgbClr val="06287E"/>
-                </a:solidFill>
-                <a:latin typeface="Courier"/>
-              </a:rPr>
-              <a:t>hist</a:t>
-            </a:r>
-            <a:r>
-              <a:rPr>
-                <a:latin typeface="Courier"/>
-              </a:rPr>
-              <a:t>(df1</a:t>
-            </a:r>
-            <a:r>
-              <a:rPr>
-                <a:solidFill>
                   <a:srgbClr val="4070A0"/>
                 </a:solidFill>
                 <a:latin typeface="Courier"/>
               </a:rPr>
-              <a:t>$</a:t>
-            </a:r>
-            <a:r>
-              <a:rPr>
-                <a:latin typeface="Courier"/>
-              </a:rPr>
-              <a:t>age, </a:t>
-            </a:r>
-            <a:r>
-              <a:rPr>
-                <a:solidFill>
-                  <a:srgbClr val="7D9029"/>
-                </a:solidFill>
-                <a:latin typeface="Courier"/>
-              </a:rPr>
-              <a:t>main =</a:t>
-            </a:r>
-            <a:r>
-              <a:rPr>
-                <a:latin typeface="Courier"/>
-              </a:rPr>
-              <a:t> </a:t>
-            </a:r>
-            <a:r>
-              <a:rPr>
-                <a:solidFill>
-                  <a:srgbClr val="4070A0"/>
-                </a:solidFill>
-                <a:latin typeface="Courier"/>
-              </a:rPr>
-              <a:t>"Distribution of age"</a:t>
-            </a:r>
-            <a:r>
-              <a:rPr>
-                <a:latin typeface="Courier"/>
-              </a:rPr>
-              <a:t>, </a:t>
-            </a:r>
-            <a:r>
-              <a:rPr>
-                <a:solidFill>
-                  <a:srgbClr val="7D9029"/>
-                </a:solidFill>
-                <a:latin typeface="Courier"/>
-              </a:rPr>
-              <a:t>xlab =</a:t>
-            </a:r>
-            <a:r>
-              <a:rPr>
-                <a:latin typeface="Courier"/>
-              </a:rPr>
-              <a:t> </a:t>
-            </a:r>
-            <a:r>
-              <a:rPr>
-                <a:solidFill>
-                  <a:srgbClr val="4070A0"/>
-                </a:solidFill>
-                <a:latin typeface="Courier"/>
-              </a:rPr>
               <a:t>"Age"</a:t>
             </a:r>
             <a:r>
               <a:rPr>
                 <a:latin typeface="Courier"/>
               </a:rPr>
-              <a:t>, </a:t>
-            </a:r>
-            <a:r>
-              <a:rPr>
-                <a:solidFill>
-                  <a:srgbClr val="7D9029"/>
-                </a:solidFill>
-                <a:latin typeface="Courier"/>
-              </a:rPr>
-              <a:t>freq =</a:t>
-            </a:r>
-            <a:r>
-              <a:rPr>
-                <a:latin typeface="Courier"/>
-              </a:rPr>
-              <a:t> </a:t>
-            </a:r>
-            <a:r>
-              <a:rPr>
-                <a:solidFill>
-                  <a:srgbClr val="880000"/>
-                </a:solidFill>
-                <a:latin typeface="Courier"/>
-              </a:rPr>
-              <a:t>FALSE</a:t>
-            </a:r>
-            <a:r>
-              <a:rPr>
-                <a:latin typeface="Courier"/>
-              </a:rPr>
-              <a:t>, </a:t>
-            </a:r>
-            <a:r>
-              <a:rPr>
-                <a:solidFill>
-                  <a:srgbClr val="7D9029"/>
-                </a:solidFill>
-                <a:latin typeface="Courier"/>
-              </a:rPr>
-              <a:t>col =</a:t>
-            </a:r>
-            <a:r>
-              <a:rPr>
-                <a:latin typeface="Courier"/>
-              </a:rPr>
-              <a:t> </a:t>
-            </a:r>
-            <a:r>
-              <a:rPr>
-                <a:solidFill>
-                  <a:srgbClr val="4070A0"/>
-                </a:solidFill>
-                <a:latin typeface="Courier"/>
-              </a:rPr>
-              <a:t>"#ffa500"</a:t>
-            </a:r>
-            <a:r>
-              <a:rPr>
-                <a:latin typeface="Courier"/>
-              </a:rPr>
-              <a:t>)</a:t>
+              <a:t>) </a:t>
             </a:r>
           </a:p>
         </p:txBody>
@@ -6891,12 +6824,34 @@
             </a:pPr>
             <a:r>
               <a:rPr>
+                <a:latin typeface="Courier"/>
+              </a:rPr>
+              <a:t>df1 </a:t>
+            </a:r>
+            <a:r>
+              <a:rPr>
+                <a:solidFill>
+                  <a:srgbClr val="4070A0"/>
+                </a:solidFill>
+                <a:latin typeface="Courier"/>
+              </a:rPr>
+              <a:t>%&gt;%</a:t>
+            </a:r>
+            <a:br/>
+            <a:r>
+              <a:rPr>
+                <a:latin typeface="Courier"/>
+              </a:rPr>
+              <a:t>  </a:t>
+            </a:r>
+            <a:r>
+              <a:rPr>
                 <a:solidFill>
                   <a:srgbClr val="06287E"/>
                 </a:solidFill>
                 <a:latin typeface="Courier"/>
               </a:rPr>
-              <a:t>par</a:t>
+              <a:t>ggplot</a:t>
             </a:r>
             <a:r>
               <a:rPr>
@@ -6911,7 +6866,7 @@
                 </a:solidFill>
                 <a:latin typeface="Courier"/>
               </a:rPr>
-              <a:t>mfrow=</a:t>
+              <a:t>mapping=</a:t>
             </a:r>
             <a:r>
               <a:rPr>
@@ -6920,7 +6875,7 @@
                 </a:solidFill>
                 <a:latin typeface="Courier"/>
               </a:rPr>
-              <a:t>c</a:t>
+              <a:t>aes</a:t>
             </a:r>
             <a:r>
               <a:rPr>
@@ -6931,10 +6886,245 @@
             <a:r>
               <a:rPr>
                 <a:solidFill>
+                  <a:srgbClr val="7D9029"/>
+                </a:solidFill>
+                <a:latin typeface="Courier"/>
+              </a:rPr>
+              <a:t>x=</a:t>
+            </a:r>
+            <a:r>
+              <a:rPr>
+                <a:latin typeface="Courier"/>
+              </a:rPr>
+              <a:t>age)) </a:t>
+            </a:r>
+            <a:r>
+              <a:rPr>
+                <a:solidFill>
+                  <a:srgbClr val="4070A0"/>
+                </a:solidFill>
+                <a:latin typeface="Courier"/>
+              </a:rPr>
+              <a:t>+</a:t>
+            </a:r>
+            <a:br/>
+            <a:r>
+              <a:rPr>
+                <a:latin typeface="Courier"/>
+              </a:rPr>
+              <a:t>  </a:t>
+            </a:r>
+            <a:r>
+              <a:rPr>
+                <a:solidFill>
+                  <a:srgbClr val="06287E"/>
+                </a:solidFill>
+                <a:latin typeface="Courier"/>
+              </a:rPr>
+              <a:t>geom_histogram</a:t>
+            </a:r>
+            <a:r>
+              <a:rPr>
+                <a:latin typeface="Courier"/>
+              </a:rPr>
+              <a:t>(</a:t>
+            </a:r>
+            <a:r>
+              <a:rPr>
+                <a:solidFill>
+                  <a:srgbClr val="7D9029"/>
+                </a:solidFill>
+                <a:latin typeface="Courier"/>
+              </a:rPr>
+              <a:t>bins=</a:t>
+            </a:r>
+            <a:r>
+              <a:rPr>
+                <a:solidFill>
                   <a:srgbClr val="40A070"/>
                 </a:solidFill>
                 <a:latin typeface="Courier"/>
               </a:rPr>
+              <a:t>20</a:t>
+            </a:r>
+            <a:r>
+              <a:rPr>
+                <a:latin typeface="Courier"/>
+              </a:rPr>
+              <a:t>) </a:t>
+            </a:r>
+            <a:r>
+              <a:rPr>
+                <a:solidFill>
+                  <a:srgbClr val="4070A0"/>
+                </a:solidFill>
+                <a:latin typeface="Courier"/>
+              </a:rPr>
+              <a:t>+</a:t>
+            </a:r>
+            <a:br/>
+            <a:r>
+              <a:rPr>
+                <a:latin typeface="Courier"/>
+              </a:rPr>
+              <a:t>  </a:t>
+            </a:r>
+            <a:r>
+              <a:rPr>
+                <a:solidFill>
+                  <a:srgbClr val="06287E"/>
+                </a:solidFill>
+                <a:latin typeface="Courier"/>
+              </a:rPr>
+              <a:t>labs</a:t>
+            </a:r>
+            <a:r>
+              <a:rPr>
+                <a:latin typeface="Courier"/>
+              </a:rPr>
+              <a:t>(</a:t>
+            </a:r>
+            <a:r>
+              <a:rPr>
+                <a:solidFill>
+                  <a:srgbClr val="7D9029"/>
+                </a:solidFill>
+                <a:latin typeface="Courier"/>
+              </a:rPr>
+              <a:t>title=</a:t>
+            </a:r>
+            <a:r>
+              <a:rPr>
+                <a:solidFill>
+                  <a:srgbClr val="4070A0"/>
+                </a:solidFill>
+                <a:latin typeface="Courier"/>
+              </a:rPr>
+              <a:t>"Histogram for Age by sex"</a:t>
+            </a:r>
+            <a:r>
+              <a:rPr>
+                <a:latin typeface="Courier"/>
+              </a:rPr>
+              <a:t>) </a:t>
+            </a:r>
+            <a:r>
+              <a:rPr>
+                <a:solidFill>
+                  <a:srgbClr val="4070A0"/>
+                </a:solidFill>
+                <a:latin typeface="Courier"/>
+              </a:rPr>
+              <a:t>+</a:t>
+            </a:r>
+            <a:br/>
+            <a:r>
+              <a:rPr>
+                <a:latin typeface="Courier"/>
+              </a:rPr>
+              <a:t>  </a:t>
+            </a:r>
+            <a:r>
+              <a:rPr>
+                <a:solidFill>
+                  <a:srgbClr val="06287E"/>
+                </a:solidFill>
+                <a:latin typeface="Courier"/>
+              </a:rPr>
+              <a:t>xlab</a:t>
+            </a:r>
+            <a:r>
+              <a:rPr>
+                <a:latin typeface="Courier"/>
+              </a:rPr>
+              <a:t>(</a:t>
+            </a:r>
+            <a:r>
+              <a:rPr>
+                <a:solidFill>
+                  <a:srgbClr val="4070A0"/>
+                </a:solidFill>
+                <a:latin typeface="Courier"/>
+              </a:rPr>
+              <a:t>"Age"</a:t>
+            </a:r>
+            <a:r>
+              <a:rPr>
+                <a:latin typeface="Courier"/>
+              </a:rPr>
+              <a:t>) </a:t>
+            </a:r>
+            <a:r>
+              <a:rPr>
+                <a:solidFill>
+                  <a:srgbClr val="4070A0"/>
+                </a:solidFill>
+                <a:latin typeface="Courier"/>
+              </a:rPr>
+              <a:t>+</a:t>
+            </a:r>
+            <a:br/>
+            <a:r>
+              <a:rPr>
+                <a:latin typeface="Courier"/>
+              </a:rPr>
+              <a:t>  </a:t>
+            </a:r>
+            <a:r>
+              <a:rPr>
+                <a:solidFill>
+                  <a:srgbClr val="06287E"/>
+                </a:solidFill>
+                <a:latin typeface="Courier"/>
+              </a:rPr>
+              <a:t>facet_wrap</a:t>
+            </a:r>
+            <a:r>
+              <a:rPr>
+                <a:latin typeface="Courier"/>
+              </a:rPr>
+              <a:t>(</a:t>
+            </a:r>
+            <a:r>
+              <a:rPr>
+                <a:solidFill>
+                  <a:srgbClr val="4070A0"/>
+                </a:solidFill>
+                <a:latin typeface="Courier"/>
+              </a:rPr>
+              <a:t>~</a:t>
+            </a:r>
+            <a:r>
+              <a:rPr>
+                <a:solidFill>
+                  <a:srgbClr val="06287E"/>
+                </a:solidFill>
+                <a:latin typeface="Courier"/>
+              </a:rPr>
+              <a:t>ifelse</a:t>
+            </a:r>
+            <a:r>
+              <a:rPr>
+                <a:latin typeface="Courier"/>
+              </a:rPr>
+              <a:t>(sex</a:t>
+            </a:r>
+            <a:r>
+              <a:rPr>
+                <a:solidFill>
+                  <a:srgbClr val="4070A0"/>
+                </a:solidFill>
+                <a:latin typeface="Courier"/>
+              </a:rPr>
+              <a:t>==</a:t>
+            </a:r>
+            <a:r>
+              <a:rPr>
+                <a:solidFill>
+                  <a:srgbClr val="40A070"/>
+                </a:solidFill>
+                <a:latin typeface="Courier"/>
+              </a:rPr>
               <a:t>1</a:t>
             </a:r>
             <a:r>
@@ -6946,35 +7136,11 @@
             <a:r>
               <a:rPr>
                 <a:solidFill>
-                  <a:srgbClr val="40A070"/>
-                </a:solidFill>
-                <a:latin typeface="Courier"/>
-              </a:rPr>
-              <a:t>2</a:t>
-            </a:r>
-            <a:r>
-              <a:rPr>
-                <a:latin typeface="Courier"/>
-              </a:rPr>
-              <a:t>), </a:t>
-            </a:r>
-            <a:r>
-              <a:rPr>
-                <a:solidFill>
-                  <a:srgbClr val="7D9029"/>
-                </a:solidFill>
-                <a:latin typeface="Courier"/>
-              </a:rPr>
-              <a:t>cex.axis=</a:t>
-            </a:r>
-            <a:r>
-              <a:rPr>
-                <a:solidFill>
-                  <a:srgbClr val="40A070"/>
-                </a:solidFill>
-                <a:latin typeface="Courier"/>
-              </a:rPr>
-              <a:t>2</a:t>
+                  <a:srgbClr val="4070A0"/>
+                </a:solidFill>
+                <a:latin typeface="Courier"/>
+              </a:rPr>
+              <a:t>"Male"</a:t>
             </a:r>
             <a:r>
               <a:rPr>
@@ -6985,334 +7151,17 @@
             <a:r>
               <a:rPr>
                 <a:solidFill>
-                  <a:srgbClr val="7D9029"/>
-                </a:solidFill>
-                <a:latin typeface="Courier"/>
-              </a:rPr>
-              <a:t>cex.lab=</a:t>
-            </a:r>
-            <a:r>
-              <a:rPr>
-                <a:solidFill>
-                  <a:srgbClr val="40A070"/>
-                </a:solidFill>
-                <a:latin typeface="Courier"/>
-              </a:rPr>
-              <a:t>2</a:t>
-            </a:r>
-            <a:r>
-              <a:rPr>
-                <a:latin typeface="Courier"/>
-              </a:rPr>
-              <a:t>)</a:t>
-            </a:r>
-            <a:br/>
-            <a:r>
-              <a:rPr>
-                <a:solidFill>
-                  <a:srgbClr val="06287E"/>
-                </a:solidFill>
-                <a:latin typeface="Courier"/>
-              </a:rPr>
-              <a:t>hist</a:t>
-            </a:r>
-            <a:r>
-              <a:rPr>
-                <a:latin typeface="Courier"/>
-              </a:rPr>
-              <a:t>(df1</a:t>
-            </a:r>
-            <a:r>
-              <a:rPr>
-                <a:solidFill>
                   <a:srgbClr val="4070A0"/>
                 </a:solidFill>
                 <a:latin typeface="Courier"/>
               </a:rPr>
-              <a:t>$</a:t>
-            </a:r>
-            <a:r>
-              <a:rPr>
-                <a:latin typeface="Courier"/>
-              </a:rPr>
-              <a:t>age[df1</a:t>
-            </a:r>
-            <a:r>
-              <a:rPr>
-                <a:solidFill>
-                  <a:srgbClr val="4070A0"/>
-                </a:solidFill>
-                <a:latin typeface="Courier"/>
-              </a:rPr>
-              <a:t>$</a:t>
-            </a:r>
-            <a:r>
-              <a:rPr>
-                <a:latin typeface="Courier"/>
-              </a:rPr>
-              <a:t>sex</a:t>
-            </a:r>
-            <a:r>
-              <a:rPr>
-                <a:solidFill>
-                  <a:srgbClr val="4070A0"/>
-                </a:solidFill>
-                <a:latin typeface="Courier"/>
-              </a:rPr>
-              <a:t>==</a:t>
-            </a:r>
-            <a:r>
-              <a:rPr>
-                <a:solidFill>
-                  <a:srgbClr val="40A070"/>
-                </a:solidFill>
-                <a:latin typeface="Courier"/>
-              </a:rPr>
-              <a:t>1</a:t>
-            </a:r>
-            <a:r>
-              <a:rPr>
-                <a:latin typeface="Courier"/>
-              </a:rPr>
-              <a:t>],</a:t>
-            </a:r>
-            <a:r>
-              <a:rPr>
-                <a:solidFill>
-                  <a:srgbClr val="7D9029"/>
-                </a:solidFill>
-                <a:latin typeface="Courier"/>
-              </a:rPr>
-              <a:t>main=</a:t>
-            </a:r>
-            <a:r>
-              <a:rPr>
-                <a:solidFill>
-                  <a:srgbClr val="4070A0"/>
-                </a:solidFill>
-                <a:latin typeface="Courier"/>
-              </a:rPr>
-              <a:t>"Histogram for Age: Males"</a:t>
-            </a:r>
-            <a:r>
-              <a:rPr>
-                <a:latin typeface="Courier"/>
-              </a:rPr>
-              <a:t>,</a:t>
-            </a:r>
-            <a:r>
-              <a:rPr>
-                <a:solidFill>
-                  <a:srgbClr val="7D9029"/>
-                </a:solidFill>
-                <a:latin typeface="Courier"/>
-              </a:rPr>
-              <a:t>xlab =</a:t>
-            </a:r>
-            <a:r>
-              <a:rPr>
-                <a:latin typeface="Courier"/>
-              </a:rPr>
-              <a:t> </a:t>
-            </a:r>
-            <a:r>
-              <a:rPr>
-                <a:solidFill>
-                  <a:srgbClr val="4070A0"/>
-                </a:solidFill>
-                <a:latin typeface="Courier"/>
-              </a:rPr>
-              <a:t>"Age"</a:t>
-            </a:r>
-            <a:r>
-              <a:rPr>
-                <a:latin typeface="Courier"/>
-              </a:rPr>
-              <a:t>, </a:t>
-            </a:r>
-            <a:r>
-              <a:rPr>
-                <a:solidFill>
-                  <a:srgbClr val="7D9029"/>
-                </a:solidFill>
-                <a:latin typeface="Courier"/>
-              </a:rPr>
-              <a:t>col =</a:t>
-            </a:r>
-            <a:r>
-              <a:rPr>
-                <a:latin typeface="Courier"/>
-              </a:rPr>
-              <a:t> </a:t>
-            </a:r>
-            <a:r>
-              <a:rPr>
-                <a:solidFill>
-                  <a:srgbClr val="4070A0"/>
-                </a:solidFill>
-                <a:latin typeface="Courier"/>
-              </a:rPr>
-              <a:t>"#0e9ed8"</a:t>
-            </a:r>
-            <a:r>
-              <a:rPr>
-                <a:latin typeface="Courier"/>
-              </a:rPr>
-              <a:t>)</a:t>
-            </a:r>
-            <a:br/>
-            <a:r>
-              <a:rPr>
-                <a:solidFill>
-                  <a:srgbClr val="06287E"/>
-                </a:solidFill>
-                <a:latin typeface="Courier"/>
-              </a:rPr>
-              <a:t>hist</a:t>
-            </a:r>
-            <a:r>
-              <a:rPr>
-                <a:latin typeface="Courier"/>
-              </a:rPr>
-              <a:t>(df1</a:t>
-            </a:r>
-            <a:r>
-              <a:rPr>
-                <a:solidFill>
-                  <a:srgbClr val="4070A0"/>
-                </a:solidFill>
-                <a:latin typeface="Courier"/>
-              </a:rPr>
-              <a:t>$</a:t>
-            </a:r>
-            <a:r>
-              <a:rPr>
-                <a:latin typeface="Courier"/>
-              </a:rPr>
-              <a:t>age[df1</a:t>
-            </a:r>
-            <a:r>
-              <a:rPr>
-                <a:solidFill>
-                  <a:srgbClr val="4070A0"/>
-                </a:solidFill>
-                <a:latin typeface="Courier"/>
-              </a:rPr>
-              <a:t>$</a:t>
-            </a:r>
-            <a:r>
-              <a:rPr>
-                <a:latin typeface="Courier"/>
-              </a:rPr>
-              <a:t>sex</a:t>
-            </a:r>
-            <a:r>
-              <a:rPr>
-                <a:solidFill>
-                  <a:srgbClr val="4070A0"/>
-                </a:solidFill>
-                <a:latin typeface="Courier"/>
-              </a:rPr>
-              <a:t>==</a:t>
-            </a:r>
-            <a:r>
-              <a:rPr>
-                <a:solidFill>
-                  <a:srgbClr val="40A070"/>
-                </a:solidFill>
-                <a:latin typeface="Courier"/>
-              </a:rPr>
-              <a:t>2</a:t>
-            </a:r>
-            <a:r>
-              <a:rPr>
-                <a:latin typeface="Courier"/>
-              </a:rPr>
-              <a:t>],</a:t>
-            </a:r>
-            <a:r>
-              <a:rPr>
-                <a:solidFill>
-                  <a:srgbClr val="7D9029"/>
-                </a:solidFill>
-                <a:latin typeface="Courier"/>
-              </a:rPr>
-              <a:t>main=</a:t>
-            </a:r>
-            <a:r>
-              <a:rPr>
-                <a:solidFill>
-                  <a:srgbClr val="4070A0"/>
-                </a:solidFill>
-                <a:latin typeface="Courier"/>
-              </a:rPr>
-              <a:t>"Histogram for Age: Females"</a:t>
-            </a:r>
-            <a:r>
-              <a:rPr>
-                <a:latin typeface="Courier"/>
-              </a:rPr>
-              <a:t>,</a:t>
-            </a:r>
-            <a:r>
-              <a:rPr>
-                <a:solidFill>
-                  <a:srgbClr val="7D9029"/>
-                </a:solidFill>
-                <a:latin typeface="Courier"/>
-              </a:rPr>
-              <a:t>xlab =</a:t>
-            </a:r>
-            <a:r>
-              <a:rPr>
-                <a:latin typeface="Courier"/>
-              </a:rPr>
-              <a:t> </a:t>
-            </a:r>
-            <a:r>
-              <a:rPr>
-                <a:solidFill>
-                  <a:srgbClr val="4070A0"/>
-                </a:solidFill>
-                <a:latin typeface="Courier"/>
-              </a:rPr>
-              <a:t>"Age"</a:t>
-            </a:r>
-            <a:r>
-              <a:rPr>
-                <a:latin typeface="Courier"/>
-              </a:rPr>
-              <a:t>, </a:t>
-            </a:r>
-            <a:r>
-              <a:rPr>
-                <a:solidFill>
-                  <a:srgbClr val="7D9029"/>
-                </a:solidFill>
-                <a:latin typeface="Courier"/>
-              </a:rPr>
-              <a:t>col =</a:t>
-            </a:r>
-            <a:r>
-              <a:rPr>
-                <a:latin typeface="Courier"/>
-              </a:rPr>
-              <a:t> </a:t>
-            </a:r>
-            <a:r>
-              <a:rPr>
-                <a:solidFill>
-                  <a:srgbClr val="4070A0"/>
-                </a:solidFill>
-                <a:latin typeface="Courier"/>
-              </a:rPr>
-              <a:t>"#ff9994"</a:t>
-            </a:r>
-            <a:r>
-              <a:rPr>
-                <a:latin typeface="Courier"/>
-              </a:rPr>
-              <a:t>)</a:t>
+              <a:t>"Female"</a:t>
+            </a:r>
+            <a:r>
+              <a:rPr>
+                <a:latin typeface="Courier"/>
+              </a:rPr>
+              <a:t>))</a:t>
             </a:r>
           </a:p>
         </p:txBody>
@@ -7456,7 +7305,47 @@
             </a:r>
             <a:r>
               <a:rPr/>
-              <a:t>)</a:t>
+              <a:t>). By default </a:t>
+            </a:r>
+            <a:r>
+              <a:rPr>
+                <a:latin typeface="Courier"/>
+              </a:rPr>
+              <a:t>var.equal</a:t>
+            </a:r>
+            <a:r>
+              <a:rPr/>
+              <a:t> is set to </a:t>
+            </a:r>
+            <a:r>
+              <a:rPr>
+                <a:latin typeface="Courier"/>
+              </a:rPr>
+              <a:t>FALSE</a:t>
+            </a:r>
+            <a:r>
+              <a:rPr/>
+              <a:t> in the function </a:t>
+            </a:r>
+            <a:r>
+              <a:rPr>
+                <a:latin typeface="Courier"/>
+              </a:rPr>
+              <a:t>t.test()</a:t>
+            </a:r>
+            <a:r>
+              <a:rPr/>
+              <a:t> and you do NOT need to check this assumption. However, this uses an approximation to the distribution used to compute the p-value and if you don’t want to make that approximation, you could set </a:t>
+            </a:r>
+            <a:r>
+              <a:rPr>
+                <a:latin typeface="Courier"/>
+              </a:rPr>
+              <a:t>var.equal=TRUE</a:t>
+            </a:r>
+            <a:r>
+              <a:rPr/>
+              <a:t> but then you need to check this assumption of equal variances. A visual inspection is usually good enough for most situations.</a:t>
             </a:r>
           </a:p>
           <a:p>
@@ -7465,12 +7354,34 @@
             </a:pPr>
             <a:r>
               <a:rPr>
+                <a:latin typeface="Courier"/>
+              </a:rPr>
+              <a:t>df1 </a:t>
+            </a:r>
+            <a:r>
+              <a:rPr>
+                <a:solidFill>
+                  <a:srgbClr val="4070A0"/>
+                </a:solidFill>
+                <a:latin typeface="Courier"/>
+              </a:rPr>
+              <a:t>%&gt;%</a:t>
+            </a:r>
+            <a:br/>
+            <a:r>
+              <a:rPr>
+                <a:latin typeface="Courier"/>
+              </a:rPr>
+              <a:t>  </a:t>
+            </a:r>
+            <a:r>
+              <a:rPr>
                 <a:solidFill>
                   <a:srgbClr val="06287E"/>
                 </a:solidFill>
                 <a:latin typeface="Courier"/>
               </a:rPr>
-              <a:t>par</a:t>
+              <a:t>ggplot</a:t>
             </a:r>
             <a:r>
               <a:rPr>
@@ -7485,7 +7396,55 @@
                 </a:solidFill>
                 <a:latin typeface="Courier"/>
               </a:rPr>
-              <a:t>cex.axis=</a:t>
+              <a:t>mapping=</a:t>
+            </a:r>
+            <a:r>
+              <a:rPr>
+                <a:solidFill>
+                  <a:srgbClr val="06287E"/>
+                </a:solidFill>
+                <a:latin typeface="Courier"/>
+              </a:rPr>
+              <a:t>aes</a:t>
+            </a:r>
+            <a:r>
+              <a:rPr>
+                <a:latin typeface="Courier"/>
+              </a:rPr>
+              <a:t>(</a:t>
+            </a:r>
+            <a:r>
+              <a:rPr>
+                <a:solidFill>
+                  <a:srgbClr val="7D9029"/>
+                </a:solidFill>
+                <a:latin typeface="Courier"/>
+              </a:rPr>
+              <a:t>x=</a:t>
+            </a:r>
+            <a:r>
+              <a:rPr>
+                <a:solidFill>
+                  <a:srgbClr val="06287E"/>
+                </a:solidFill>
+                <a:latin typeface="Courier"/>
+              </a:rPr>
+              <a:t>ifelse</a:t>
+            </a:r>
+            <a:r>
+              <a:rPr>
+                <a:latin typeface="Courier"/>
+              </a:rPr>
+              <a:t>(sex</a:t>
+            </a:r>
+            <a:r>
+              <a:rPr>
+                <a:solidFill>
+                  <a:srgbClr val="4070A0"/>
+                </a:solidFill>
+                <a:latin typeface="Courier"/>
+              </a:rPr>
+              <a:t>==</a:t>
             </a:r>
             <a:r>
               <a:rPr>
@@ -7494,7 +7453,7 @@
                 </a:solidFill>
                 <a:latin typeface="Courier"/>
               </a:rPr>
-              <a:t>2</a:t>
+              <a:t>1</a:t>
             </a:r>
             <a:r>
               <a:rPr>
@@ -7505,11 +7464,80 @@
             <a:r>
               <a:rPr>
                 <a:solidFill>
+                  <a:srgbClr val="4070A0"/>
+                </a:solidFill>
+                <a:latin typeface="Courier"/>
+              </a:rPr>
+              <a:t>"Male"</a:t>
+            </a:r>
+            <a:r>
+              <a:rPr>
+                <a:latin typeface="Courier"/>
+              </a:rPr>
+              <a:t>,</a:t>
+            </a:r>
+            <a:r>
+              <a:rPr>
+                <a:solidFill>
+                  <a:srgbClr val="4070A0"/>
+                </a:solidFill>
+                <a:latin typeface="Courier"/>
+              </a:rPr>
+              <a:t>"Female"</a:t>
+            </a:r>
+            <a:r>
+              <a:rPr>
+                <a:latin typeface="Courier"/>
+              </a:rPr>
+              <a:t>),</a:t>
+            </a:r>
+            <a:r>
+              <a:rPr>
+                <a:solidFill>
                   <a:srgbClr val="7D9029"/>
                 </a:solidFill>
                 <a:latin typeface="Courier"/>
               </a:rPr>
-              <a:t>cex.lab=</a:t>
+              <a:t>y=</a:t>
+            </a:r>
+            <a:r>
+              <a:rPr>
+                <a:latin typeface="Courier"/>
+              </a:rPr>
+              <a:t>age,</a:t>
+            </a:r>
+            <a:r>
+              <a:rPr>
+                <a:solidFill>
+                  <a:srgbClr val="7D9029"/>
+                </a:solidFill>
+                <a:latin typeface="Courier"/>
+              </a:rPr>
+              <a:t>fill=</a:t>
+            </a:r>
+            <a:r>
+              <a:rPr>
+                <a:solidFill>
+                  <a:srgbClr val="06287E"/>
+                </a:solidFill>
+                <a:latin typeface="Courier"/>
+              </a:rPr>
+              <a:t>ifelse</a:t>
+            </a:r>
+            <a:r>
+              <a:rPr>
+                <a:latin typeface="Courier"/>
+              </a:rPr>
+              <a:t>(sex</a:t>
+            </a:r>
+            <a:r>
+              <a:rPr>
+                <a:solidFill>
+                  <a:srgbClr val="4070A0"/>
+                </a:solidFill>
+                <a:latin typeface="Courier"/>
+              </a:rPr>
+              <a:t>==</a:t>
             </a:r>
             <a:r>
               <a:rPr>
@@ -7518,29 +7546,98 @@
                 </a:solidFill>
                 <a:latin typeface="Courier"/>
               </a:rPr>
-              <a:t>2</a:t>
-            </a:r>
-            <a:r>
-              <a:rPr>
-                <a:latin typeface="Courier"/>
-              </a:rPr>
-              <a:t>)</a:t>
+              <a:t>1</a:t>
+            </a:r>
+            <a:r>
+              <a:rPr>
+                <a:latin typeface="Courier"/>
+              </a:rPr>
+              <a:t>,</a:t>
+            </a:r>
+            <a:r>
+              <a:rPr>
+                <a:solidFill>
+                  <a:srgbClr val="4070A0"/>
+                </a:solidFill>
+                <a:latin typeface="Courier"/>
+              </a:rPr>
+              <a:t>"Male"</a:t>
+            </a:r>
+            <a:r>
+              <a:rPr>
+                <a:latin typeface="Courier"/>
+              </a:rPr>
+              <a:t>,</a:t>
+            </a:r>
+            <a:r>
+              <a:rPr>
+                <a:solidFill>
+                  <a:srgbClr val="4070A0"/>
+                </a:solidFill>
+                <a:latin typeface="Courier"/>
+              </a:rPr>
+              <a:t>"Female"</a:t>
+            </a:r>
+            <a:r>
+              <a:rPr>
+                <a:latin typeface="Courier"/>
+              </a:rPr>
+              <a:t>))) </a:t>
+            </a:r>
+            <a:r>
+              <a:rPr>
+                <a:solidFill>
+                  <a:srgbClr val="4070A0"/>
+                </a:solidFill>
+                <a:latin typeface="Courier"/>
+              </a:rPr>
+              <a:t>+</a:t>
             </a:r>
             <a:br/>
             <a:r>
               <a:rPr>
+                <a:latin typeface="Courier"/>
+              </a:rPr>
+              <a:t>  </a:t>
+            </a:r>
+            <a:r>
+              <a:rPr>
                 <a:solidFill>
                   <a:srgbClr val="06287E"/>
                 </a:solidFill>
                 <a:latin typeface="Courier"/>
               </a:rPr>
-              <a:t>boxplot</a:t>
-            </a:r>
-            <a:r>
-              <a:rPr>
-                <a:latin typeface="Courier"/>
-              </a:rPr>
-              <a:t>(age </a:t>
+              <a:t>scale_fill_manual</a:t>
+            </a:r>
+            <a:r>
+              <a:rPr>
+                <a:latin typeface="Courier"/>
+              </a:rPr>
+              <a:t>(</a:t>
+            </a:r>
+            <a:r>
+              <a:rPr>
+                <a:solidFill>
+                  <a:srgbClr val="7D9029"/>
+                </a:solidFill>
+                <a:latin typeface="Courier"/>
+              </a:rPr>
+              <a:t>values=</a:t>
+            </a:r>
+            <a:r>
+              <a:rPr>
+                <a:solidFill>
+                  <a:srgbClr val="06287E"/>
+                </a:solidFill>
+                <a:latin typeface="Courier"/>
+              </a:rPr>
+              <a:t>c</a:t>
+            </a:r>
+            <a:r>
+              <a:rPr>
+                <a:latin typeface="Courier"/>
+              </a:rPr>
+              <a:t>(</a:t>
             </a:r>
             <a:r>
               <a:rPr>
@@ -7549,13 +7646,28 @@
                 </a:solidFill>
                 <a:latin typeface="Courier"/>
               </a:rPr>
-              <a:t>~</a:t>
-            </a:r>
-            <a:r>
-              <a:rPr>
-                <a:latin typeface="Courier"/>
-              </a:rPr>
-              <a:t> sex, </a:t>
+              <a:t>"steelblue"</a:t>
+            </a:r>
+            <a:r>
+              <a:rPr>
+                <a:latin typeface="Courier"/>
+              </a:rPr>
+              <a:t>,</a:t>
+            </a:r>
+            <a:r>
+              <a:rPr>
+                <a:solidFill>
+                  <a:srgbClr val="4070A0"/>
+                </a:solidFill>
+                <a:latin typeface="Courier"/>
+              </a:rPr>
+              <a:t>"orange"</a:t>
+            </a:r>
+            <a:r>
+              <a:rPr>
+                <a:latin typeface="Courier"/>
+              </a:rPr>
+              <a:t>),</a:t>
             </a:r>
             <a:r>
               <a:rPr>
@@ -7564,22 +7676,38 @@
                 </a:solidFill>
                 <a:latin typeface="Courier"/>
               </a:rPr>
-              <a:t>data=</a:t>
-            </a:r>
-            <a:r>
-              <a:rPr>
-                <a:latin typeface="Courier"/>
-              </a:rPr>
-              <a:t>df1,</a:t>
-            </a:r>
-            <a:r>
-              <a:rPr>
-                <a:solidFill>
-                  <a:srgbClr val="7D9029"/>
-                </a:solidFill>
-                <a:latin typeface="Courier"/>
-              </a:rPr>
-              <a:t>names=</a:t>
+              <a:t>name=</a:t>
+            </a:r>
+            <a:r>
+              <a:rPr>
+                <a:solidFill>
+                  <a:srgbClr val="4070A0"/>
+                </a:solidFill>
+                <a:latin typeface="Courier"/>
+              </a:rPr>
+              <a:t>"Sex"</a:t>
+            </a:r>
+            <a:r>
+              <a:rPr>
+                <a:latin typeface="Courier"/>
+              </a:rPr>
+              <a:t>) </a:t>
+            </a:r>
+            <a:r>
+              <a:rPr>
+                <a:solidFill>
+                  <a:srgbClr val="4070A0"/>
+                </a:solidFill>
+                <a:latin typeface="Courier"/>
+              </a:rPr>
+              <a:t>+</a:t>
+            </a:r>
+            <a:br/>
+            <a:r>
+              <a:rPr>
+                <a:latin typeface="Courier"/>
+              </a:rPr>
+              <a:t>  </a:t>
             </a:r>
             <a:r>
               <a:rPr>
@@ -7588,97 +7716,13 @@
                 </a:solidFill>
                 <a:latin typeface="Courier"/>
               </a:rPr>
-              <a:t>c</a:t>
-            </a:r>
-            <a:r>
-              <a:rPr>
-                <a:latin typeface="Courier"/>
-              </a:rPr>
-              <a:t>(</a:t>
-            </a:r>
-            <a:r>
-              <a:rPr>
-                <a:solidFill>
-                  <a:srgbClr val="4070A0"/>
-                </a:solidFill>
-                <a:latin typeface="Courier"/>
-              </a:rPr>
-              <a:t>"Male"</a:t>
-            </a:r>
-            <a:r>
-              <a:rPr>
-                <a:latin typeface="Courier"/>
-              </a:rPr>
-              <a:t>,</a:t>
-            </a:r>
-            <a:r>
-              <a:rPr>
-                <a:solidFill>
-                  <a:srgbClr val="4070A0"/>
-                </a:solidFill>
-                <a:latin typeface="Courier"/>
-              </a:rPr>
-              <a:t>"Female"</a:t>
-            </a:r>
-            <a:r>
-              <a:rPr>
-                <a:latin typeface="Courier"/>
-              </a:rPr>
-              <a:t>), </a:t>
-            </a:r>
-            <a:r>
-              <a:rPr>
-                <a:solidFill>
-                  <a:srgbClr val="7D9029"/>
-                </a:solidFill>
-                <a:latin typeface="Courier"/>
-              </a:rPr>
-              <a:t>col=</a:t>
-            </a:r>
-            <a:r>
-              <a:rPr>
-                <a:solidFill>
-                  <a:srgbClr val="06287E"/>
-                </a:solidFill>
-                <a:latin typeface="Courier"/>
-              </a:rPr>
-              <a:t>c</a:t>
-            </a:r>
-            <a:r>
-              <a:rPr>
-                <a:latin typeface="Courier"/>
-              </a:rPr>
-              <a:t>(</a:t>
-            </a:r>
-            <a:r>
-              <a:rPr>
-                <a:solidFill>
-                  <a:srgbClr val="4070A0"/>
-                </a:solidFill>
-                <a:latin typeface="Courier"/>
-              </a:rPr>
-              <a:t>"#0e9ed8"</a:t>
-            </a:r>
-            <a:r>
-              <a:rPr>
-                <a:latin typeface="Courier"/>
-              </a:rPr>
-              <a:t>,</a:t>
-            </a:r>
-            <a:r>
-              <a:rPr>
-                <a:solidFill>
-                  <a:srgbClr val="4070A0"/>
-                </a:solidFill>
-                <a:latin typeface="Courier"/>
-              </a:rPr>
-              <a:t>"#ff9994"</a:t>
-            </a:r>
-            <a:r>
-              <a:rPr>
-                <a:latin typeface="Courier"/>
-              </a:rPr>
-              <a:t>)) </a:t>
+              <a:t>geom_boxplot</a:t>
+            </a:r>
+            <a:r>
+              <a:rPr>
+                <a:latin typeface="Courier"/>
+              </a:rPr>
+              <a:t>()</a:t>
             </a:r>
           </a:p>
         </p:txBody>
@@ -18836,7 +18880,7 @@
               <a:rPr>
                 <a:latin typeface="Courier"/>
               </a:rPr>
-              <a:t>## [1] 0.4754</a:t>
+              <a:t>## [1] 0.4956</a:t>
             </a:r>
           </a:p>
         </p:txBody>

</xml_diff>